<commit_message>
Updated presentation and added union types example
</commit_message>
<xml_diff>
--- a/Hidden Gems In TypeScript.pptx
+++ b/Hidden Gems In TypeScript.pptx
@@ -3912,8 +3912,12 @@
               <a:buNone/>
             </a:pPr>
             <a:r>
+              <a:rPr lang="en-US" dirty="0" smtClean="0"/>
+              <a:t>Jake </a:t>
+            </a:r>
+            <a:r>
               <a:rPr lang="en-US" dirty="0"/>
-              <a:t>Jacob Adams</a:t>
+              <a:t>Adams</a:t>
             </a:r>
           </a:p>
           <a:p>
@@ -4029,7 +4033,7 @@
         <p:spPr/>
         <p:txBody>
           <a:bodyPr>
-            <a:normAutofit fontScale="25000" lnSpcReduction="20000"/>
+            <a:normAutofit fontScale="47500" lnSpcReduction="20000"/>
           </a:bodyPr>
           <a:lstStyle/>
           <a:p>
@@ -4048,15 +4052,12 @@
           <a:p>
             <a:pPr lvl="1"/>
             <a:r>
+              <a:rPr lang="en-US" dirty="0" smtClean="0"/>
+              <a:t>Type </a:t>
+            </a:r>
+            <a:r>
               <a:rPr lang="en-US" dirty="0"/>
-              <a:t>Intersection Types</a:t>
-            </a:r>
-          </a:p>
-          <a:p>
-            <a:pPr lvl="1"/>
-            <a:r>
-              <a:rPr lang="en-US" dirty="0"/>
-              <a:t>Type Guard - </a:t>
+              <a:t>Guard - </a:t>
             </a:r>
             <a:r>
               <a:rPr lang="en-US" dirty="0" err="1"/>
@@ -4134,16 +4135,12 @@
           <a:p>
             <a:pPr lvl="1"/>
             <a:r>
-              <a:rPr lang="en-US" dirty="0" err="1"/>
-              <a:t>Destructuring</a:t>
-            </a:r>
-            <a:endParaRPr lang="en-US" dirty="0"/>
-          </a:p>
-          <a:p>
-            <a:pPr lvl="1"/>
+              <a:rPr lang="en-US" dirty="0" smtClean="0"/>
+              <a:t>Template </a:t>
+            </a:r>
             <a:r>
               <a:rPr lang="en-US" dirty="0"/>
-              <a:t>Template strings</a:t>
+              <a:t>strings</a:t>
             </a:r>
           </a:p>
           <a:p>
@@ -4179,14 +4176,7 @@
           <a:p>
             <a:pPr lvl="1"/>
             <a:r>
-              <a:rPr lang="en-US" dirty="0"/>
-              <a:t>Libs</a:t>
-            </a:r>
-          </a:p>
-          <a:p>
-            <a:pPr lvl="1"/>
-            <a:r>
-              <a:rPr lang="en-US" dirty="0"/>
+              <a:rPr lang="en-US" dirty="0" smtClean="0"/>
               <a:t>Allow </a:t>
             </a:r>
             <a:r>
@@ -4206,15 +4196,12 @@
           <a:p>
             <a:pPr lvl="1"/>
             <a:r>
+              <a:rPr lang="en-US" dirty="0" smtClean="0"/>
+              <a:t>Declaration </a:t>
+            </a:r>
+            <a:r>
               <a:rPr lang="en-US" dirty="0"/>
-              <a:t>List files?</a:t>
-            </a:r>
-          </a:p>
-          <a:p>
-            <a:pPr lvl="1"/>
-            <a:r>
-              <a:rPr lang="en-US" dirty="0"/>
-              <a:t>Declaration ( create .</a:t>
+              <a:t>( create .</a:t>
             </a:r>
             <a:r>
               <a:rPr lang="en-US" dirty="0" err="1"/>
@@ -4261,45 +4248,13 @@
             </a:r>
             <a:r>
               <a:rPr lang="en-US" dirty="0"/>
-              <a:t> errors</a:t>
-            </a:r>
-          </a:p>
-          <a:p>
-            <a:r>
-              <a:rPr lang="en-US" dirty="0" err="1"/>
-              <a:t>TSLint</a:t>
+              <a:t> </a:t>
+            </a:r>
+            <a:r>
+              <a:rPr lang="en-US" dirty="0" smtClean="0"/>
+              <a:t>errors</a:t>
             </a:r>
             <a:endParaRPr lang="en-US" dirty="0"/>
-          </a:p>
-          <a:p>
-            <a:r>
-              <a:rPr lang="en-US" dirty="0"/>
-              <a:t>Lint type check (</a:t>
-            </a:r>
-            <a:r>
-              <a:rPr lang="en-US" dirty="0" err="1"/>
-              <a:t>noununused</a:t>
-            </a:r>
-            <a:r>
-              <a:rPr lang="en-US" dirty="0"/>
-              <a:t> </a:t>
-            </a:r>
-            <a:r>
-              <a:rPr lang="en-US" dirty="0" err="1"/>
-              <a:t>params</a:t>
-            </a:r>
-            <a:r>
-              <a:rPr lang="en-US" dirty="0"/>
-              <a:t>, </a:t>
-            </a:r>
-            <a:r>
-              <a:rPr lang="en-US" dirty="0" err="1"/>
-              <a:t>etc</a:t>
-            </a:r>
-            <a:r>
-              <a:rPr lang="en-US" dirty="0"/>
-              <a:t>)</a:t>
-            </a:r>
           </a:p>
         </p:txBody>
       </p:sp>
@@ -4514,7 +4469,7 @@
         <p:spPr/>
         <p:txBody>
           <a:bodyPr>
-            <a:normAutofit fontScale="55000" lnSpcReduction="20000"/>
+            <a:normAutofit fontScale="85000" lnSpcReduction="20000"/>
           </a:bodyPr>
           <a:lstStyle/>
           <a:p>
@@ -4534,8 +4489,24 @@
             <a:pPr lvl="1"/>
             <a:r>
               <a:rPr lang="en-US" dirty="0"/>
-              <a:t>Index Types</a:t>
-            </a:r>
+              <a:t>Index </a:t>
+            </a:r>
+            <a:r>
+              <a:rPr lang="en-US" dirty="0" smtClean="0"/>
+              <a:t>Types</a:t>
+            </a:r>
+          </a:p>
+          <a:p>
+            <a:pPr lvl="1"/>
+            <a:r>
+              <a:rPr lang="en-US" dirty="0"/>
+              <a:t>Intersection </a:t>
+            </a:r>
+            <a:r>
+              <a:rPr lang="en-US" dirty="0" smtClean="0"/>
+              <a:t>Types</a:t>
+            </a:r>
+            <a:endParaRPr lang="en-US" dirty="0"/>
           </a:p>
           <a:p>
             <a:r>
@@ -4547,8 +4518,24 @@
             <a:pPr lvl="1"/>
             <a:r>
               <a:rPr lang="en-US" dirty="0"/>
-              <a:t>Template strings</a:t>
-            </a:r>
+              <a:t>Template </a:t>
+            </a:r>
+            <a:r>
+              <a:rPr lang="en-US" dirty="0" smtClean="0"/>
+              <a:t>strings</a:t>
+            </a:r>
+          </a:p>
+          <a:p>
+            <a:pPr lvl="1"/>
+            <a:r>
+              <a:rPr lang="en-US" dirty="0" err="1"/>
+              <a:t>Destructuring</a:t>
+            </a:r>
+            <a:endParaRPr lang="en-US" dirty="0"/>
+          </a:p>
+          <a:p>
+            <a:pPr lvl="1"/>
+            <a:endParaRPr lang="en-US" dirty="0"/>
           </a:p>
           <a:p>
             <a:r>
@@ -4559,114 +4546,29 @@
           <a:p>
             <a:pPr lvl="1"/>
             <a:r>
-              <a:rPr lang="en-US" dirty="0" err="1"/>
-              <a:t>tsc</a:t>
+              <a:rPr lang="en-US" dirty="0" smtClean="0"/>
+              <a:t>Libs</a:t>
+            </a:r>
+            <a:endParaRPr lang="en-US" dirty="0"/>
+          </a:p>
+          <a:p>
+            <a:pPr lvl="1"/>
+            <a:r>
+              <a:rPr lang="en-US" dirty="0" smtClean="0"/>
+              <a:t>List </a:t>
             </a:r>
             <a:r>
               <a:rPr lang="en-US" dirty="0"/>
-              <a:t> </a:t>
-            </a:r>
-            <a:r>
-              <a:rPr lang="en-US" dirty="0" err="1"/>
-              <a:t>init</a:t>
+              <a:t>files?</a:t>
+            </a:r>
+          </a:p>
+          <a:p>
+            <a:pPr lvl="1"/>
+            <a:r>
+              <a:rPr lang="en-US" dirty="0" err="1" smtClean="0"/>
+              <a:t>Linting</a:t>
             </a:r>
             <a:endParaRPr lang="en-US" dirty="0"/>
-          </a:p>
-          <a:p>
-            <a:pPr lvl="1"/>
-            <a:r>
-              <a:rPr lang="en-US" dirty="0" err="1"/>
-              <a:t>Skiplibcheck</a:t>
-            </a:r>
-            <a:endParaRPr lang="en-US" dirty="0"/>
-          </a:p>
-          <a:p>
-            <a:pPr lvl="1"/>
-            <a:r>
-              <a:rPr lang="en-US" dirty="0"/>
-              <a:t>Libs</a:t>
-            </a:r>
-          </a:p>
-          <a:p>
-            <a:pPr lvl="1"/>
-            <a:r>
-              <a:rPr lang="en-US" dirty="0"/>
-              <a:t>Allow </a:t>
-            </a:r>
-            <a:r>
-              <a:rPr lang="en-US" dirty="0" err="1"/>
-              <a:t>js</a:t>
-            </a:r>
-            <a:r>
-              <a:rPr lang="en-US" dirty="0"/>
-              <a:t> / </a:t>
-            </a:r>
-            <a:r>
-              <a:rPr lang="en-US" dirty="0" err="1"/>
-              <a:t>checkjs</a:t>
-            </a:r>
-            <a:endParaRPr lang="en-US" dirty="0"/>
-          </a:p>
-          <a:p>
-            <a:pPr lvl="1"/>
-            <a:r>
-              <a:rPr lang="en-US" dirty="0"/>
-              <a:t>List files?</a:t>
-            </a:r>
-          </a:p>
-          <a:p>
-            <a:pPr lvl="1"/>
-            <a:r>
-              <a:rPr lang="en-US" dirty="0"/>
-              <a:t>Declaration ( create .</a:t>
-            </a:r>
-            <a:r>
-              <a:rPr lang="en-US" dirty="0" err="1"/>
-              <a:t>d.ts</a:t>
-            </a:r>
-            <a:r>
-              <a:rPr lang="en-US" dirty="0"/>
-              <a:t> files? / </a:t>
-            </a:r>
-            <a:r>
-              <a:rPr lang="en-US" dirty="0" err="1"/>
-              <a:t>emitdeclarations</a:t>
-            </a:r>
-            <a:endParaRPr lang="en-US" dirty="0"/>
-          </a:p>
-          <a:p>
-            <a:pPr lvl="1"/>
-            <a:r>
-              <a:rPr lang="en-US" dirty="0"/>
-              <a:t>Strict null checks  nullable types</a:t>
-            </a:r>
-          </a:p>
-          <a:p>
-            <a:pPr lvl="1"/>
-            <a:r>
-              <a:rPr lang="en-US" dirty="0" err="1"/>
-              <a:t>Typecersion</a:t>
-            </a:r>
-            <a:endParaRPr lang="en-US" dirty="0"/>
-          </a:p>
-          <a:p>
-            <a:pPr lvl="1"/>
-            <a:r>
-              <a:rPr lang="en-US" dirty="0" err="1"/>
-              <a:t>Preserveconstenum</a:t>
-            </a:r>
-            <a:endParaRPr lang="en-US" dirty="0"/>
-          </a:p>
-          <a:p>
-            <a:pPr lvl="1"/>
-            <a:r>
-              <a:rPr lang="en-US" dirty="0" err="1"/>
-              <a:t>Supressexcessproperty</a:t>
-            </a:r>
-            <a:r>
-              <a:rPr lang="en-US" dirty="0"/>
-              <a:t> errors</a:t>
-            </a:r>
           </a:p>
           <a:p>
             <a:r>
@@ -4674,36 +4576,6 @@
               <a:t>TSLint</a:t>
             </a:r>
             <a:endParaRPr lang="en-US" dirty="0"/>
-          </a:p>
-          <a:p>
-            <a:r>
-              <a:rPr lang="en-US" dirty="0"/>
-              <a:t>Lint type check (</a:t>
-            </a:r>
-            <a:r>
-              <a:rPr lang="en-US" dirty="0" err="1"/>
-              <a:t>noununused</a:t>
-            </a:r>
-            <a:r>
-              <a:rPr lang="en-US" dirty="0"/>
-              <a:t> </a:t>
-            </a:r>
-            <a:r>
-              <a:rPr lang="en-US" dirty="0" err="1"/>
-              <a:t>params</a:t>
-            </a:r>
-            <a:r>
-              <a:rPr lang="en-US" dirty="0"/>
-              <a:t>, </a:t>
-            </a:r>
-            <a:r>
-              <a:rPr lang="en-US" dirty="0" err="1"/>
-              <a:t>etc</a:t>
-            </a:r>
-            <a:r>
-              <a:rPr lang="en-US" dirty="0"/>
-              <a:t>)</a:t>
-            </a:r>
           </a:p>
           <a:p>
             <a:pPr marL="0" indent="0">

</xml_diff>

<commit_message>
Added allowjs, excess properties and nullable type examples
</commit_message>
<xml_diff>
--- a/Hidden Gems In TypeScript.pptx
+++ b/Hidden Gems In TypeScript.pptx
@@ -4152,15 +4152,15 @@
           <a:p>
             <a:pPr lvl="1"/>
             <a:r>
-              <a:rPr lang="en-US" dirty="0" err="1"/>
-              <a:t>tsc</a:t>
-            </a:r>
-            <a:r>
-              <a:rPr lang="en-US" dirty="0"/>
-              <a:t> </a:t>
-            </a:r>
-            <a:r>
-              <a:rPr lang="en-US" dirty="0" err="1"/>
+              <a:rPr lang="en-US" dirty="0" err="1" smtClean="0"/>
+              <a:t>Tsc</a:t>
+            </a:r>
+            <a:r>
+              <a:rPr lang="en-US" dirty="0" smtClean="0"/>
+              <a:t> --</a:t>
+            </a:r>
+            <a:r>
+              <a:rPr lang="en-US" dirty="0" err="1" smtClean="0"/>
               <a:t>init</a:t>
             </a:r>
             <a:endParaRPr lang="en-US" dirty="0"/>

</xml_diff>

<commit_message>
Presentation additions and allowjs additions. Removed unused example
</commit_message>
<xml_diff>
--- a/Hidden Gems In TypeScript.pptx
+++ b/Hidden Gems In TypeScript.pptx
@@ -4263,7 +4263,11 @@
             </a:pPr>
             <a:r>
               <a:rPr lang="en-US" dirty="0" smtClean="0"/>
-              <a:t>Jake Adams</a:t>
+              <a:t>Jake </a:t>
+            </a:r>
+            <a:r>
+              <a:rPr lang="en-US" dirty="0" smtClean="0"/>
+              <a:t>Adams</a:t>
             </a:r>
           </a:p>
           <a:p>
@@ -4272,7 +4276,7 @@
             </a:pPr>
             <a:r>
               <a:rPr lang="en-US" dirty="0" smtClean="0"/>
-              <a:t>Senior Software Architect</a:t>
+              <a:t>Father / Husband</a:t>
             </a:r>
           </a:p>
           <a:p>
@@ -4281,7 +4285,19 @@
             </a:pPr>
             <a:r>
               <a:rPr lang="en-US" dirty="0" smtClean="0"/>
-              <a:t>Thompson Coburn LLP</a:t>
+              <a:t>Senior </a:t>
+            </a:r>
+            <a:r>
+              <a:rPr lang="en-US" dirty="0" smtClean="0"/>
+              <a:t>Software </a:t>
+            </a:r>
+            <a:r>
+              <a:rPr lang="en-US" dirty="0" smtClean="0"/>
+              <a:t>Architect - Thompson </a:t>
+            </a:r>
+            <a:r>
+              <a:rPr lang="en-US" dirty="0" smtClean="0"/>
+              <a:t>Coburn LLP</a:t>
             </a:r>
           </a:p>
           <a:p>
@@ -4492,11 +4508,7 @@
             <a:pPr lvl="1"/>
             <a:r>
               <a:rPr lang="en-US" dirty="0" smtClean="0"/>
-              <a:t>Literal </a:t>
-            </a:r>
-            <a:r>
-              <a:rPr lang="en-US" dirty="0" smtClean="0"/>
-              <a:t>Types</a:t>
+              <a:t>Literal Types</a:t>
             </a:r>
             <a:endParaRPr lang="en-US" dirty="0"/>
           </a:p>
@@ -4864,7 +4876,6 @@
               <a:rPr lang="en-US" dirty="0" smtClean="0"/>
               <a:t>Types</a:t>
             </a:r>
-            <a:endParaRPr lang="en-US" dirty="0" smtClean="0"/>
           </a:p>
           <a:p>
             <a:pPr lvl="1"/>
@@ -4900,11 +4911,7 @@
             <a:pPr lvl="1"/>
             <a:r>
               <a:rPr lang="en-US" dirty="0" smtClean="0"/>
-              <a:t>Conditional </a:t>
-            </a:r>
-            <a:r>
-              <a:rPr lang="en-US" dirty="0" smtClean="0"/>
-              <a:t>Types</a:t>
+              <a:t>Conditional Types</a:t>
             </a:r>
             <a:endParaRPr lang="en-US" dirty="0"/>
           </a:p>
@@ -4943,11 +4950,7 @@
             <a:pPr lvl="1"/>
             <a:r>
               <a:rPr lang="en-US" dirty="0" smtClean="0"/>
-              <a:t>l</a:t>
-            </a:r>
-            <a:r>
-              <a:rPr lang="en-US" dirty="0" smtClean="0"/>
-              <a:t>ib</a:t>
+              <a:t>lib</a:t>
             </a:r>
             <a:endParaRPr lang="en-US" dirty="0"/>
           </a:p>

</xml_diff>

<commit_message>
switch order or examples
</commit_message>
<xml_diff>
--- a/Hidden Gems In TypeScript.pptx
+++ b/Hidden Gems In TypeScript.pptx
@@ -3614,6 +3614,13 @@
   <p:clrMapOvr>
     <a:masterClrMapping/>
   </p:clrMapOvr>
+  <p:timing>
+    <p:tnLst>
+      <p:par>
+        <p:cTn id="1" dur="indefinite" restart="never" nodeType="tmRoot"/>
+      </p:par>
+    </p:tnLst>
+  </p:timing>
 </p:sld>
 </file>
 
@@ -3838,6 +3845,13 @@
   <p:clrMapOvr>
     <a:masterClrMapping/>
   </p:clrMapOvr>
+  <p:timing>
+    <p:tnLst>
+      <p:par>
+        <p:cTn id="1" dur="indefinite" restart="never" nodeType="tmRoot"/>
+      </p:par>
+    </p:tnLst>
+  </p:timing>
 </p:sld>
 </file>
 
@@ -4094,6 +4108,13 @@
   <p:clrMapOvr>
     <a:masterClrMapping/>
   </p:clrMapOvr>
+  <p:timing>
+    <p:tnLst>
+      <p:par>
+        <p:cTn id="1" dur="indefinite" restart="never" nodeType="tmRoot"/>
+      </p:par>
+    </p:tnLst>
+  </p:timing>
 </p:sld>
 </file>
 
@@ -4189,6 +4210,13 @@
   <p:clrMapOvr>
     <a:masterClrMapping/>
   </p:clrMapOvr>
+  <p:timing>
+    <p:tnLst>
+      <p:par>
+        <p:cTn id="1" dur="indefinite" restart="never" nodeType="tmRoot"/>
+      </p:par>
+    </p:tnLst>
+  </p:timing>
 </p:sld>
 </file>
 
@@ -4263,11 +4291,7 @@
             </a:pPr>
             <a:r>
               <a:rPr lang="en-US" dirty="0" smtClean="0"/>
-              <a:t>Jake </a:t>
-            </a:r>
-            <a:r>
-              <a:rPr lang="en-US" dirty="0" smtClean="0"/>
-              <a:t>Adams</a:t>
+              <a:t>Jake Adams</a:t>
             </a:r>
           </a:p>
           <a:p>
@@ -4285,19 +4309,7 @@
             </a:pPr>
             <a:r>
               <a:rPr lang="en-US" dirty="0" smtClean="0"/>
-              <a:t>Senior </a:t>
-            </a:r>
-            <a:r>
-              <a:rPr lang="en-US" dirty="0" smtClean="0"/>
-              <a:t>Software </a:t>
-            </a:r>
-            <a:r>
-              <a:rPr lang="en-US" dirty="0" smtClean="0"/>
-              <a:t>Architect - Thompson </a:t>
-            </a:r>
-            <a:r>
-              <a:rPr lang="en-US" dirty="0" smtClean="0"/>
-              <a:t>Coburn LLP</a:t>
+              <a:t>Senior Software Architect - Thompson Coburn LLP</a:t>
             </a:r>
           </a:p>
           <a:p>
@@ -4377,6 +4389,13 @@
   <p:clrMapOvr>
     <a:masterClrMapping/>
   </p:clrMapOvr>
+  <p:timing>
+    <p:tnLst>
+      <p:par>
+        <p:cTn id="1" dur="indefinite" restart="never" nodeType="tmRoot"/>
+      </p:par>
+    </p:tnLst>
+  </p:timing>
 </p:sld>
 </file>
 
@@ -4487,20 +4506,15 @@
           <a:p>
             <a:pPr lvl="1"/>
             <a:r>
-              <a:rPr lang="en-US" dirty="0" err="1"/>
+              <a:rPr lang="en-US" dirty="0" smtClean="0"/>
+              <a:t>Type Aliases</a:t>
+            </a:r>
+          </a:p>
+          <a:p>
+            <a:pPr lvl="1"/>
+            <a:r>
+              <a:rPr lang="en-US" dirty="0" err="1" smtClean="0"/>
               <a:t>readonly</a:t>
-            </a:r>
-            <a:endParaRPr lang="en-US" dirty="0"/>
-          </a:p>
-          <a:p>
-            <a:pPr lvl="1"/>
-            <a:r>
-              <a:rPr lang="en-US" dirty="0"/>
-              <a:t>Type </a:t>
-            </a:r>
-            <a:r>
-              <a:rPr lang="en-US" dirty="0" smtClean="0"/>
-              <a:t>Aliases</a:t>
             </a:r>
             <a:endParaRPr lang="en-US" dirty="0"/>
           </a:p>
@@ -4786,6 +4800,13 @@
   <p:clrMapOvr>
     <a:masterClrMapping/>
   </p:clrMapOvr>
+  <p:timing>
+    <p:tnLst>
+      <p:par>
+        <p:cTn id="1" dur="indefinite" restart="never" nodeType="tmRoot"/>
+      </p:par>
+    </p:tnLst>
+  </p:timing>
 </p:sld>
 </file>
 
@@ -5028,6 +5049,13 @@
   <p:clrMapOvr>
     <a:masterClrMapping/>
   </p:clrMapOvr>
+  <p:timing>
+    <p:tnLst>
+      <p:par>
+        <p:cTn id="1" dur="indefinite" restart="never" nodeType="tmRoot"/>
+      </p:par>
+    </p:tnLst>
+  </p:timing>
 </p:sld>
 </file>
 
@@ -5141,6 +5169,13 @@
   <p:clrMapOvr>
     <a:masterClrMapping/>
   </p:clrMapOvr>
+  <p:timing>
+    <p:tnLst>
+      <p:par>
+        <p:cTn id="1" dur="indefinite" restart="never" nodeType="tmRoot"/>
+      </p:par>
+    </p:tnLst>
+  </p:timing>
 </p:sld>
 </file>
 
@@ -5249,6 +5284,13 @@
   <p:clrMapOvr>
     <a:masterClrMapping/>
   </p:clrMapOvr>
+  <p:timing>
+    <p:tnLst>
+      <p:par>
+        <p:cTn id="1" dur="indefinite" restart="never" nodeType="tmRoot"/>
+      </p:par>
+    </p:tnLst>
+  </p:timing>
 </p:sld>
 </file>
 
@@ -5348,6 +5390,13 @@
   <p:clrMapOvr>
     <a:masterClrMapping/>
   </p:clrMapOvr>
+  <p:timing>
+    <p:tnLst>
+      <p:par>
+        <p:cTn id="1" dur="indefinite" restart="never" nodeType="tmRoot"/>
+      </p:par>
+    </p:tnLst>
+  </p:timing>
 </p:sld>
 </file>
 
@@ -5467,6 +5516,13 @@
   <p:clrMapOvr>
     <a:masterClrMapping/>
   </p:clrMapOvr>
+  <p:timing>
+    <p:tnLst>
+      <p:par>
+        <p:cTn id="1" dur="indefinite" restart="never" nodeType="tmRoot"/>
+      </p:par>
+    </p:tnLst>
+  </p:timing>
 </p:sld>
 </file>
 
@@ -5665,6 +5721,13 @@
   <p:clrMapOvr>
     <a:masterClrMapping/>
   </p:clrMapOvr>
+  <p:timing>
+    <p:tnLst>
+      <p:par>
+        <p:cTn id="1" dur="indefinite" restart="never" nodeType="tmRoot"/>
+      </p:par>
+    </p:tnLst>
+  </p:timing>
 </p:sld>
 </file>
 

</xml_diff>

<commit_message>
Added Additional Resources to Presentation
</commit_message>
<xml_diff>
--- a/Hidden Gems In TypeScript.pptx
+++ b/Hidden Gems In TypeScript.pptx
@@ -5,7 +5,7 @@
     <p:sldMasterId id="2147483648" r:id="rId1"/>
   </p:sldMasterIdLst>
   <p:notesMasterIdLst>
-    <p:notesMasterId r:id="rId14"/>
+    <p:notesMasterId r:id="rId16"/>
   </p:notesMasterIdLst>
   <p:sldIdLst>
     <p:sldId id="256" r:id="rId2"/>
@@ -19,7 +19,9 @@
     <p:sldId id="265" r:id="rId10"/>
     <p:sldId id="267" r:id="rId11"/>
     <p:sldId id="268" r:id="rId12"/>
-    <p:sldId id="266" r:id="rId13"/>
+    <p:sldId id="269" r:id="rId13"/>
+    <p:sldId id="270" r:id="rId14"/>
+    <p:sldId id="266" r:id="rId15"/>
   </p:sldIdLst>
   <p:sldSz cx="12192000" cy="6858000"/>
   <p:notesSz cx="6858000" cy="9144000"/>
@@ -4150,6 +4152,194 @@
           <a:bodyPr/>
           <a:lstStyle/>
           <a:p>
+            <a:endParaRPr lang="en-US" dirty="0"/>
+          </a:p>
+        </p:txBody>
+      </p:sp>
+      <p:sp>
+        <p:nvSpPr>
+          <p:cNvPr id="3" name="Text Placeholder 2"/>
+          <p:cNvSpPr>
+            <a:spLocks noGrp="1"/>
+          </p:cNvSpPr>
+          <p:nvPr>
+            <p:ph type="body" idx="1"/>
+          </p:nvPr>
+        </p:nvSpPr>
+        <p:spPr/>
+        <p:txBody>
+          <a:bodyPr/>
+          <a:lstStyle/>
+          <a:p>
+            <a:endParaRPr lang="en-US"/>
+          </a:p>
+        </p:txBody>
+      </p:sp>
+      <p:sp>
+        <p:nvSpPr>
+          <p:cNvPr id="4" name="Footer Placeholder 3"/>
+          <p:cNvSpPr>
+            <a:spLocks noGrp="1"/>
+          </p:cNvSpPr>
+          <p:nvPr>
+            <p:ph type="ftr" sz="quarter" idx="10"/>
+          </p:nvPr>
+        </p:nvSpPr>
+        <p:spPr/>
+        <p:txBody>
+          <a:bodyPr/>
+          <a:lstStyle/>
+          <a:p>
+            <a:pPr algn="l"/>
+            <a:r>
+              <a:rPr lang="en-US" smtClean="0"/>
+              <a:t>@jacobladams          http://bit.ly/jaketsgems</a:t>
+            </a:r>
+            <a:endParaRPr lang="en-US" dirty="0"/>
+          </a:p>
+        </p:txBody>
+      </p:sp>
+    </p:spTree>
+    <p:extLst>
+      <p:ext uri="{BB962C8B-B14F-4D97-AF65-F5344CB8AC3E}">
+        <p14:creationId xmlns:p14="http://schemas.microsoft.com/office/powerpoint/2010/main" val="1296235542"/>
+      </p:ext>
+    </p:extLst>
+  </p:cSld>
+  <p:clrMapOvr>
+    <a:masterClrMapping/>
+  </p:clrMapOvr>
+</p:sld>
+</file>
+
+<file path=ppt/slides/slide13.xml><?xml version="1.0" encoding="utf-8"?>
+<p:sld xmlns:a="http://schemas.openxmlformats.org/drawingml/2006/main" xmlns:r="http://schemas.openxmlformats.org/officeDocument/2006/relationships" xmlns:p="http://schemas.openxmlformats.org/presentationml/2006/main">
+  <p:cSld>
+    <p:spTree>
+      <p:nvGrpSpPr>
+        <p:cNvPr id="1" name=""/>
+        <p:cNvGrpSpPr/>
+        <p:nvPr/>
+      </p:nvGrpSpPr>
+      <p:grpSpPr>
+        <a:xfrm>
+          <a:off x="0" y="0"/>
+          <a:ext cx="0" cy="0"/>
+          <a:chOff x="0" y="0"/>
+          <a:chExt cx="0" cy="0"/>
+        </a:xfrm>
+      </p:grpSpPr>
+      <p:sp>
+        <p:nvSpPr>
+          <p:cNvPr id="2" name="Title 1"/>
+          <p:cNvSpPr>
+            <a:spLocks noGrp="1"/>
+          </p:cNvSpPr>
+          <p:nvPr>
+            <p:ph type="title"/>
+          </p:nvPr>
+        </p:nvSpPr>
+        <p:spPr/>
+        <p:txBody>
+          <a:bodyPr/>
+          <a:lstStyle/>
+          <a:p>
+            <a:r>
+              <a:rPr lang="en-US" dirty="0" smtClean="0"/>
+              <a:t>More Demos</a:t>
+            </a:r>
+            <a:endParaRPr lang="en-US" dirty="0"/>
+          </a:p>
+        </p:txBody>
+      </p:sp>
+      <p:sp>
+        <p:nvSpPr>
+          <p:cNvPr id="3" name="Text Placeholder 2"/>
+          <p:cNvSpPr>
+            <a:spLocks noGrp="1"/>
+          </p:cNvSpPr>
+          <p:nvPr>
+            <p:ph type="body" idx="1"/>
+          </p:nvPr>
+        </p:nvSpPr>
+        <p:spPr/>
+        <p:txBody>
+          <a:bodyPr/>
+          <a:lstStyle/>
+          <a:p>
+            <a:endParaRPr lang="en-US"/>
+          </a:p>
+        </p:txBody>
+      </p:sp>
+      <p:sp>
+        <p:nvSpPr>
+          <p:cNvPr id="4" name="Footer Placeholder 3"/>
+          <p:cNvSpPr>
+            <a:spLocks noGrp="1"/>
+          </p:cNvSpPr>
+          <p:nvPr>
+            <p:ph type="ftr" sz="quarter" idx="10"/>
+          </p:nvPr>
+        </p:nvSpPr>
+        <p:spPr/>
+        <p:txBody>
+          <a:bodyPr/>
+          <a:lstStyle/>
+          <a:p>
+            <a:pPr algn="l"/>
+            <a:r>
+              <a:rPr lang="en-US" smtClean="0"/>
+              <a:t>@jacobladams          http://bit.ly/jaketsgems</a:t>
+            </a:r>
+            <a:endParaRPr lang="en-US" dirty="0"/>
+          </a:p>
+        </p:txBody>
+      </p:sp>
+    </p:spTree>
+    <p:extLst>
+      <p:ext uri="{BB962C8B-B14F-4D97-AF65-F5344CB8AC3E}">
+        <p14:creationId xmlns:p14="http://schemas.microsoft.com/office/powerpoint/2010/main" val="2179470097"/>
+      </p:ext>
+    </p:extLst>
+  </p:cSld>
+  <p:clrMapOvr>
+    <a:masterClrMapping/>
+  </p:clrMapOvr>
+</p:sld>
+</file>
+
+<file path=ppt/slides/slide14.xml><?xml version="1.0" encoding="utf-8"?>
+<p:sld xmlns:a="http://schemas.openxmlformats.org/drawingml/2006/main" xmlns:r="http://schemas.openxmlformats.org/officeDocument/2006/relationships" xmlns:p="http://schemas.openxmlformats.org/presentationml/2006/main">
+  <p:cSld>
+    <p:spTree>
+      <p:nvGrpSpPr>
+        <p:cNvPr id="1" name=""/>
+        <p:cNvGrpSpPr/>
+        <p:nvPr/>
+      </p:nvGrpSpPr>
+      <p:grpSpPr>
+        <a:xfrm>
+          <a:off x="0" y="0"/>
+          <a:ext cx="0" cy="0"/>
+          <a:chOff x="0" y="0"/>
+          <a:chExt cx="0" cy="0"/>
+        </a:xfrm>
+      </p:grpSpPr>
+      <p:sp>
+        <p:nvSpPr>
+          <p:cNvPr id="2" name="Title 1"/>
+          <p:cNvSpPr>
+            <a:spLocks noGrp="1"/>
+          </p:cNvSpPr>
+          <p:nvPr>
+            <p:ph type="title"/>
+          </p:nvPr>
+        </p:nvSpPr>
+        <p:spPr/>
+        <p:txBody>
+          <a:bodyPr/>
+          <a:lstStyle/>
+          <a:p>
             <a:r>
               <a:rPr lang="en-US" dirty="0" smtClean="0"/>
               <a:t>Additional Resources / Questions</a:t>
@@ -4172,6 +4362,72 @@
         <p:txBody>
           <a:bodyPr/>
           <a:lstStyle/>
+          <a:p>
+            <a:r>
+              <a:rPr lang="en-US" dirty="0" smtClean="0">
+                <a:hlinkClick r:id="rId2"/>
+              </a:rPr>
+              <a:t>10 </a:t>
+            </a:r>
+            <a:r>
+              <a:rPr lang="en-US" dirty="0" err="1" smtClean="0">
+                <a:hlinkClick r:id="rId2"/>
+              </a:rPr>
+              <a:t>TypeScript</a:t>
+            </a:r>
+            <a:r>
+              <a:rPr lang="en-US" dirty="0" smtClean="0">
+                <a:hlinkClick r:id="rId2"/>
+              </a:rPr>
+              <a:t> Features You Might Not Know</a:t>
+            </a:r>
+            <a:endParaRPr lang="en-US" dirty="0" smtClean="0"/>
+          </a:p>
+          <a:p>
+            <a:r>
+              <a:rPr lang="en-US" dirty="0" err="1" smtClean="0">
+                <a:hlinkClick r:id="rId3"/>
+              </a:rPr>
+              <a:t>TypeScript</a:t>
+            </a:r>
+            <a:r>
+              <a:rPr lang="en-US" dirty="0" smtClean="0">
+                <a:hlinkClick r:id="rId3"/>
+              </a:rPr>
+              <a:t> Advanced Types</a:t>
+            </a:r>
+            <a:endParaRPr lang="en-US" dirty="0" smtClean="0"/>
+          </a:p>
+          <a:p>
+            <a:r>
+              <a:rPr lang="en-US" dirty="0" err="1" smtClean="0">
+                <a:hlinkClick r:id="rId4"/>
+              </a:rPr>
+              <a:t>tsconfig.json</a:t>
+            </a:r>
+            <a:r>
+              <a:rPr lang="en-US" dirty="0" smtClean="0">
+                <a:hlinkClick r:id="rId4"/>
+              </a:rPr>
+              <a:t> Documentation</a:t>
+            </a:r>
+            <a:endParaRPr lang="en-US" dirty="0" smtClean="0"/>
+          </a:p>
+          <a:p>
+            <a:r>
+              <a:rPr lang="en-US" dirty="0" err="1" smtClean="0">
+                <a:hlinkClick r:id="rId5"/>
+              </a:rPr>
+              <a:t>TypeScript</a:t>
+            </a:r>
+            <a:r>
+              <a:rPr lang="en-US" dirty="0" smtClean="0">
+                <a:hlinkClick r:id="rId5"/>
+              </a:rPr>
+              <a:t> Compiler Options</a:t>
+            </a:r>
+            <a:endParaRPr lang="en-US" dirty="0" smtClean="0"/>
+          </a:p>
           <a:p>
             <a:endParaRPr lang="en-US" dirty="0"/>
           </a:p>

</xml_diff>

<commit_message>
Added Advanced Types Image
</commit_message>
<xml_diff>
--- a/Hidden Gems In TypeScript.pptx
+++ b/Hidden Gems In TypeScript.pptx
@@ -12,7 +12,7 @@
     <p:sldId id="257" r:id="rId3"/>
     <p:sldId id="260" r:id="rId4"/>
     <p:sldId id="261" r:id="rId5"/>
-    <p:sldId id="259" r:id="rId6"/>
+    <p:sldId id="271" r:id="rId6"/>
     <p:sldId id="262" r:id="rId7"/>
     <p:sldId id="263" r:id="rId8"/>
     <p:sldId id="264" r:id="rId9"/>
@@ -5334,104 +5334,101 @@
       </p:grpSpPr>
       <p:sp>
         <p:nvSpPr>
-          <p:cNvPr id="2" name="Title 1">
+          <p:cNvPr id="2" name="Title 1"/>
+          <p:cNvSpPr>
+            <a:spLocks noGrp="1"/>
+          </p:cNvSpPr>
+          <p:nvPr>
+            <p:ph type="title"/>
+          </p:nvPr>
+        </p:nvSpPr>
+        <p:spPr/>
+        <p:txBody>
+          <a:bodyPr/>
+          <a:lstStyle/>
+          <a:p>
+            <a:r>
+              <a:rPr lang="en-US" dirty="0" smtClean="0"/>
+              <a:t>Advanced Types</a:t>
+            </a:r>
+            <a:endParaRPr lang="en-US" dirty="0"/>
+          </a:p>
+        </p:txBody>
+      </p:sp>
+      <p:sp>
+        <p:nvSpPr>
+          <p:cNvPr id="3" name="Footer Placeholder 2"/>
+          <p:cNvSpPr>
+            <a:spLocks noGrp="1"/>
+          </p:cNvSpPr>
+          <p:nvPr>
+            <p:ph type="ftr" sz="quarter" idx="11"/>
+          </p:nvPr>
+        </p:nvSpPr>
+        <p:spPr/>
+        <p:txBody>
+          <a:bodyPr/>
+          <a:lstStyle/>
+          <a:p>
+            <a:r>
+              <a:rPr lang="en-US" smtClean="0"/>
+              <a:t>@jacobladams          http://bit.ly/jaketsgems</a:t>
+            </a:r>
+            <a:endParaRPr lang="en-US" dirty="0"/>
+          </a:p>
+        </p:txBody>
+      </p:sp>
+      <p:pic>
+        <p:nvPicPr>
+          <p:cNvPr id="4" name="Picture 2" descr="Related image"/>
+          <p:cNvPicPr>
+            <a:picLocks noChangeAspect="1" noChangeArrowheads="1"/>
+          </p:cNvPicPr>
+          <p:nvPr/>
+        </p:nvPicPr>
+        <p:blipFill>
+          <a:blip r:embed="rId2">
             <a:extLst>
-              <a:ext uri="{FF2B5EF4-FFF2-40B4-BE49-F238E27FC236}">
-                <a16:creationId xmlns:a16="http://schemas.microsoft.com/office/drawing/2014/main" id="{49FCD186-497D-48B1-9400-81F36A80CFD5}"/>
+              <a:ext uri="{28A0092B-C50C-407E-A947-70E740481C1C}">
+                <a14:useLocalDpi xmlns:a14="http://schemas.microsoft.com/office/drawing/2010/main" val="0"/>
               </a:ext>
             </a:extLst>
-          </p:cNvPr>
-          <p:cNvSpPr>
-            <a:spLocks noGrp="1"/>
-          </p:cNvSpPr>
-          <p:nvPr>
-            <p:ph type="title"/>
-          </p:nvPr>
-        </p:nvSpPr>
-        <p:spPr/>
-        <p:txBody>
-          <a:bodyPr/>
-          <a:lstStyle/>
-          <a:p>
-            <a:r>
-              <a:rPr lang="en-US" dirty="0"/>
-              <a:t>Advanced Types</a:t>
-            </a:r>
-          </a:p>
-        </p:txBody>
-      </p:sp>
-      <p:sp>
-        <p:nvSpPr>
-          <p:cNvPr id="3" name="Text Placeholder 2">
-            <a:extLst>
-              <a:ext uri="{FF2B5EF4-FFF2-40B4-BE49-F238E27FC236}">
-                <a16:creationId xmlns:a16="http://schemas.microsoft.com/office/drawing/2014/main" id="{6770D74E-04DD-4D15-ACDB-AFC6B4FB1033}"/>
-              </a:ext>
-            </a:extLst>
-          </p:cNvPr>
-          <p:cNvSpPr>
-            <a:spLocks noGrp="1"/>
-          </p:cNvSpPr>
-          <p:nvPr>
-            <p:ph type="body" idx="1"/>
-          </p:nvPr>
-        </p:nvSpPr>
-        <p:spPr/>
-        <p:txBody>
-          <a:bodyPr/>
-          <a:lstStyle/>
-          <a:p>
-            <a:endParaRPr lang="en-US" dirty="0"/>
-          </a:p>
-        </p:txBody>
-      </p:sp>
-      <p:sp>
-        <p:nvSpPr>
-          <p:cNvPr id="4" name="Footer Placeholder 3">
-            <a:extLst>
-              <a:ext uri="{FF2B5EF4-FFF2-40B4-BE49-F238E27FC236}">
-                <a16:creationId xmlns:a16="http://schemas.microsoft.com/office/drawing/2014/main" id="{ABC0CD89-5D2E-4833-B70E-852F68E129F9}"/>
-              </a:ext>
-            </a:extLst>
-          </p:cNvPr>
-          <p:cNvSpPr>
-            <a:spLocks noGrp="1"/>
-          </p:cNvSpPr>
-          <p:nvPr>
-            <p:ph type="ftr" sz="quarter" idx="10"/>
-          </p:nvPr>
-        </p:nvSpPr>
-        <p:spPr/>
-        <p:txBody>
-          <a:bodyPr/>
-          <a:lstStyle/>
-          <a:p>
-            <a:pPr algn="l"/>
-            <a:r>
-              <a:rPr lang="en-US" smtClean="0"/>
-              <a:t>@jacobladams          http://bit.ly/jaketsgems</a:t>
-            </a:r>
-            <a:endParaRPr lang="en-US" dirty="0"/>
-          </a:p>
-        </p:txBody>
-      </p:sp>
+          </a:blip>
+          <a:srcRect/>
+          <a:stretch>
+            <a:fillRect/>
+          </a:stretch>
+        </p:blipFill>
+        <p:spPr bwMode="auto">
+          <a:xfrm>
+            <a:off x="838200" y="1586589"/>
+            <a:ext cx="6801816" cy="4569583"/>
+          </a:xfrm>
+          <a:prstGeom prst="rect">
+            <a:avLst/>
+          </a:prstGeom>
+          <a:noFill/>
+          <a:extLst>
+            <a:ext uri="{909E8E84-426E-40DD-AFC4-6F175D3DCCD1}">
+              <a14:hiddenFill xmlns:a14="http://schemas.microsoft.com/office/drawing/2010/main">
+                <a:solidFill>
+                  <a:srgbClr val="FFFFFF"/>
+                </a:solidFill>
+              </a14:hiddenFill>
+            </a:ext>
+          </a:extLst>
+        </p:spPr>
+      </p:pic>
     </p:spTree>
     <p:extLst>
       <p:ext uri="{BB962C8B-B14F-4D97-AF65-F5344CB8AC3E}">
-        <p14:creationId xmlns:p14="http://schemas.microsoft.com/office/powerpoint/2010/main" val="3426865345"/>
+        <p14:creationId xmlns:p14="http://schemas.microsoft.com/office/powerpoint/2010/main" val="3913176494"/>
       </p:ext>
     </p:extLst>
   </p:cSld>
   <p:clrMapOvr>
     <a:masterClrMapping/>
   </p:clrMapOvr>
-  <p:timing>
-    <p:tnLst>
-      <p:par>
-        <p:cTn id="1" dur="indefinite" restart="never" nodeType="tmRoot"/>
-      </p:par>
-    </p:tnLst>
-  </p:timing>
 </p:sld>
 </file>
 

</xml_diff>